<commit_message>
Update Algorithm Java Basic week1 report 2021.12.22 02:20
</commit_message>
<xml_diff>
--- a/W1.Java_basic/Workspace/W1_Report.pptx
+++ b/W1.Java_basic/Workspace/W1_Report.pptx
@@ -211,7 +211,7 @@
           <a:p>
             <a:fld id="{F6F60C9F-9B84-4D95-A2E1-A9FADB892299}" type="datetimeFigureOut">
               <a:rPr lang="ko-KR" altLang="en-US" smtClean="0"/>
-              <a:t>2017-09-12</a:t>
+              <a:t>2021. 12. 22.</a:t>
             </a:fld>
             <a:endParaRPr lang="ko-KR" altLang="en-US"/>
           </a:p>
@@ -750,7 +750,7 @@
           <a:p>
             <a:fld id="{FB30EDBD-1C2D-4C1E-B459-B60219FAB484}" type="datetimeFigureOut">
               <a:rPr lang="ko-KR" altLang="en-US" smtClean="0"/>
-              <a:t>2017-09-12</a:t>
+              <a:t>2021. 12. 22.</a:t>
             </a:fld>
             <a:endParaRPr lang="ko-KR" altLang="en-US"/>
           </a:p>
@@ -950,7 +950,7 @@
           <a:p>
             <a:fld id="{FB30EDBD-1C2D-4C1E-B459-B60219FAB484}" type="datetimeFigureOut">
               <a:rPr lang="ko-KR" altLang="en-US" smtClean="0"/>
-              <a:t>2017-09-12</a:t>
+              <a:t>2021. 12. 22.</a:t>
             </a:fld>
             <a:endParaRPr lang="ko-KR" altLang="en-US"/>
           </a:p>
@@ -1125,7 +1125,7 @@
           <a:p>
             <a:fld id="{FB30EDBD-1C2D-4C1E-B459-B60219FAB484}" type="datetimeFigureOut">
               <a:rPr lang="ko-KR" altLang="en-US" smtClean="0"/>
-              <a:t>2017-09-12</a:t>
+              <a:t>2021. 12. 22.</a:t>
             </a:fld>
             <a:endParaRPr lang="ko-KR" altLang="en-US"/>
           </a:p>
@@ -1290,7 +1290,7 @@
           <a:p>
             <a:fld id="{FB30EDBD-1C2D-4C1E-B459-B60219FAB484}" type="datetimeFigureOut">
               <a:rPr lang="ko-KR" altLang="en-US" smtClean="0"/>
-              <a:t>2017-09-12</a:t>
+              <a:t>2021. 12. 22.</a:t>
             </a:fld>
             <a:endParaRPr lang="ko-KR" altLang="en-US"/>
           </a:p>
@@ -1538,7 +1538,7 @@
           <a:p>
             <a:fld id="{FB30EDBD-1C2D-4C1E-B459-B60219FAB484}" type="datetimeFigureOut">
               <a:rPr lang="ko-KR" altLang="en-US" smtClean="0"/>
-              <a:t>2017-09-12</a:t>
+              <a:t>2021. 12. 22.</a:t>
             </a:fld>
             <a:endParaRPr lang="ko-KR" altLang="en-US"/>
           </a:p>
@@ -1856,7 +1856,7 @@
           <a:p>
             <a:fld id="{FB30EDBD-1C2D-4C1E-B459-B60219FAB484}" type="datetimeFigureOut">
               <a:rPr lang="ko-KR" altLang="en-US" smtClean="0"/>
-              <a:t>2017-09-12</a:t>
+              <a:t>2021. 12. 22.</a:t>
             </a:fld>
             <a:endParaRPr lang="ko-KR" altLang="en-US"/>
           </a:p>
@@ -2322,7 +2322,7 @@
           <a:p>
             <a:fld id="{FB30EDBD-1C2D-4C1E-B459-B60219FAB484}" type="datetimeFigureOut">
               <a:rPr lang="ko-KR" altLang="en-US" smtClean="0"/>
-              <a:t>2017-09-12</a:t>
+              <a:t>2021. 12. 22.</a:t>
             </a:fld>
             <a:endParaRPr lang="ko-KR" altLang="en-US"/>
           </a:p>
@@ -2470,7 +2470,7 @@
           <a:p>
             <a:fld id="{FB30EDBD-1C2D-4C1E-B459-B60219FAB484}" type="datetimeFigureOut">
               <a:rPr lang="ko-KR" altLang="en-US" smtClean="0"/>
-              <a:t>2017-09-12</a:t>
+              <a:t>2021. 12. 22.</a:t>
             </a:fld>
             <a:endParaRPr lang="ko-KR" altLang="en-US"/>
           </a:p>
@@ -2560,7 +2560,7 @@
           <a:p>
             <a:fld id="{FB30EDBD-1C2D-4C1E-B459-B60219FAB484}" type="datetimeFigureOut">
               <a:rPr lang="ko-KR" altLang="en-US" smtClean="0"/>
-              <a:t>2017-09-12</a:t>
+              <a:t>2021. 12. 22.</a:t>
             </a:fld>
             <a:endParaRPr lang="ko-KR" altLang="en-US"/>
           </a:p>
@@ -2834,7 +2834,7 @@
           <a:p>
             <a:fld id="{FB30EDBD-1C2D-4C1E-B459-B60219FAB484}" type="datetimeFigureOut">
               <a:rPr lang="ko-KR" altLang="en-US" smtClean="0"/>
-              <a:t>2017-09-12</a:t>
+              <a:t>2021. 12. 22.</a:t>
             </a:fld>
             <a:endParaRPr lang="ko-KR" altLang="en-US"/>
           </a:p>
@@ -3139,7 +3139,7 @@
           <a:p>
             <a:fld id="{FB30EDBD-1C2D-4C1E-B459-B60219FAB484}" type="datetimeFigureOut">
               <a:rPr lang="ko-KR" altLang="en-US" smtClean="0"/>
-              <a:t>2017-09-12</a:t>
+              <a:t>2021. 12. 22.</a:t>
             </a:fld>
             <a:endParaRPr lang="ko-KR" altLang="en-US"/>
           </a:p>
@@ -3437,7 +3437,7 @@
           <a:p>
             <a:fld id="{FB30EDBD-1C2D-4C1E-B459-B60219FAB484}" type="datetimeFigureOut">
               <a:rPr lang="ko-KR" altLang="en-US" smtClean="0"/>
-              <a:t>2017-09-12</a:t>
+              <a:t>2021. 12. 22.</a:t>
             </a:fld>
             <a:endParaRPr lang="ko-KR" altLang="en-US"/>
           </a:p>
@@ -3876,21 +3876,16 @@
               <a:t>한국외국어대학교 글로벌캠퍼스 </a:t>
             </a:r>
             <a:r>
-              <a:rPr lang="en-US" altLang="ko-KR" dirty="0"/>
+              <a:rPr lang="en-US" altLang="ko-KR"/>
               <a:t>GBT </a:t>
             </a:r>
           </a:p>
           <a:p>
             <a:r>
-              <a:rPr lang="en-US" altLang="ko-KR" dirty="0"/>
-              <a:t>201600765</a:t>
-            </a:r>
-          </a:p>
-          <a:p>
-            <a:r>
-              <a:rPr lang="ko-KR" altLang="en-US" dirty="0"/>
+              <a:rPr lang="ko-KR" altLang="en-US"/>
               <a:t>김주원</a:t>
             </a:r>
+            <a:endParaRPr lang="ko-KR" altLang="en-US" dirty="0"/>
           </a:p>
         </p:txBody>
       </p:sp>

</xml_diff>